<commit_message>
1.0.0 Stable version, update frontend, backend, readme file, see readme
</commit_message>
<xml_diff>
--- a/storage/app.pptx
+++ b/storage/app.pptx
@@ -5,8 +5,10 @@
     <p:sldMasterId id="2147483648" r:id="rId1"/>
   </p:sldMasterIdLst>
   <p:sldIdLst>
-    <p:sldId id="256" r:id="rId-c195e5db-6233-44d5-9377-74577c13c5a4"/>
-    <p:sldId id="257" r:id="rId-76b27be0-6bc4-4698-bc44-74e1287c94a5"/>
+    <p:sldId id="256" r:id="rId-6d96cb0b-c0be-4bae-a801-1ea40fabe6b1"/>
+    <p:sldId id="257" r:id="rId-adc1b352-72de-4ff6-a1e4-8bc143e4470a"/>
+    <p:sldId id="258" r:id="rId-2d7e8e93-3b0a-4c7d-b0e6-1d8395c6d998"/>
+    <p:sldId id="259" r:id="rId-2226a183-4bd6-4db8-8397-7e19efc0dfba"/>
   </p:sldIdLst>
   <p:sldSz cx="9144000" cy="6858000"/>
   <p:notesSz cx="9144000" cy="6858000"/>
@@ -720,14 +722,14 @@
                 <a:latin typeface="Calibri" pitchFamily="0" charset="0"/>
                 <a:cs typeface="Calibri" pitchFamily="0" charset="0"/>
               </a:rPr>
-              <a:t>муйайц</a:t>
+              <a:t>Птица киви</a:t>
             </a:r>
           </a:p>
         </p:txBody>
       </p:sp>
       <p:sp>
         <p:nvSpPr>
-          <p:cNvPr id="2" name="Text 2"/>
+          <p:cNvPr id="3" name="Text 3"/>
           <p:cNvSpPr txBox="1"/>
           <p:nvPr/>
         </p:nvSpPr>
@@ -754,11 +756,35 @@
                 <a:latin typeface="Calibri" pitchFamily="0" charset="0"/>
                 <a:cs typeface="Calibri" pitchFamily="0" charset="0"/>
               </a:rPr>
-              <a:t>асййвц.</a:t>
+              <a:t>Ки́ви (лат Apteryx) — единственный род бескилевых птиц в одноимённом семействе (Apterygidae) и отряде кивиобра́зных, или бескры́лых (Apterygiformes).</a:t>
             </a:r>
           </a:p>
         </p:txBody>
       </p:sp>
+      <p:pic>
+        <p:nvPicPr>
+          <p:cNvPr id="4" name="image-ba71ecec-4bf5-4a9d-8a31-2ce9f35d5b8d.jpg 4" descr="image-ba71ecec-4bf5-4a9d-8a31-2ce9f35d5b8d.jpg"/>
+          <p:cNvPicPr>
+            <a:picLocks noChangeAspect="1"/>
+          </p:cNvPicPr>
+          <p:nvPr/>
+        </p:nvPicPr>
+        <p:blipFill>
+          <a:blip r:embed="rId2" cstate="print"/>
+          <a:stretch>
+            <a:fillRect/>
+          </a:stretch>
+        </p:blipFill>
+        <p:spPr>
+          <a:xfrm>
+            <a:off x="4699000" y="1905000"/>
+            <a:ext cx="3810000" cy="2857500"/>
+          </a:xfrm>
+          <a:prstGeom prst="rect">
+            <a:avLst/>
+          </a:prstGeom>
+        </p:spPr>
+      </p:pic>
     </p:spTree>
   </p:cSld>
   <p:clrMapOvr>
@@ -836,14 +862,14 @@
                 <a:latin typeface="Calibri" pitchFamily="0" charset="0"/>
                 <a:cs typeface="Calibri" pitchFamily="0" charset="0"/>
               </a:rPr>
-              <a:t>айвйцва</a:t>
+              <a:t>Характеристика</a:t>
             </a:r>
           </a:p>
         </p:txBody>
       </p:sp>
       <p:sp>
         <p:nvSpPr>
-          <p:cNvPr id="2" name="Text 2"/>
+          <p:cNvPr id="3" name="Text 3"/>
           <p:cNvSpPr txBox="1"/>
           <p:nvPr/>
         </p:nvSpPr>
@@ -870,11 +896,291 @@
                 <a:latin typeface="Calibri" pitchFamily="0" charset="0"/>
                 <a:cs typeface="Calibri" pitchFamily="0" charset="0"/>
               </a:rPr>
-              <a:t>айупйцв.</a:t>
+              <a:t>Включает пять видов, эндемичных для Новой Зеландии.</a:t>
             </a:r>
           </a:p>
         </p:txBody>
       </p:sp>
+      <p:pic>
+        <p:nvPicPr>
+          <p:cNvPr id="4" name="image-126ec006-e388-4bb5-83a1-53d126dee5e3.jpg 4" descr="image-126ec006-e388-4bb5-83a1-53d126dee5e3.jpg"/>
+          <p:cNvPicPr>
+            <a:picLocks noChangeAspect="1"/>
+          </p:cNvPicPr>
+          <p:nvPr/>
+        </p:nvPicPr>
+        <p:blipFill>
+          <a:blip r:embed="rId2" cstate="print"/>
+          <a:stretch>
+            <a:fillRect/>
+          </a:stretch>
+        </p:blipFill>
+        <p:spPr>
+          <a:xfrm>
+            <a:off x="4699000" y="1905000"/>
+            <a:ext cx="3810000" cy="2540000"/>
+          </a:xfrm>
+          <a:prstGeom prst="rect">
+            <a:avLst/>
+          </a:prstGeom>
+        </p:spPr>
+      </p:pic>
+    </p:spTree>
+  </p:cSld>
+  <p:clrMapOvr>
+    <a:masterClrMapping/>
+  </p:clrMapOvr>
+</p:sld>
+</file>
+
+<file path=ppt/slides/slide3.xml><?xml version="1.0" encoding="utf-8"?>
+<p:sld xmlns:a="http://schemas.openxmlformats.org/drawingml/2006/main" xmlns:r="http://schemas.openxmlformats.org/officeDocument/2006/relationships" xmlns:p="http://schemas.openxmlformats.org/presentationml/2006/main">
+  <p:cSld name="Blank">
+    <p:spTree>
+      <p:nvGrpSpPr>
+        <p:cNvPr id="1" name=""/>
+        <p:cNvGrpSpPr/>
+        <p:nvPr/>
+      </p:nvGrpSpPr>
+      <p:grpSpPr>
+        <a:xfrm>
+          <a:off x="0" y="0"/>
+          <a:ext cx="0" cy="0"/>
+          <a:chOff x="0" y="0"/>
+          <a:chExt cx="0" cy="0"/>
+        </a:xfrm>
+      </p:grpSpPr>
+      <p:sp>
+        <p:nvSpPr>
+          <p:cNvPr id="4" name="Slide Number Placeholder 3"/>
+          <p:cNvSpPr>
+            <a:spLocks noGrp="1"/>
+          </p:cNvSpPr>
+          <p:nvPr>
+            <p:ph type="sldNum" sz="quarter" idx="12"/>
+          </p:nvPr>
+        </p:nvSpPr>
+        <p:spPr/>
+        <p:txBody>
+          <a:bodyPr/>
+          <a:lstStyle/>
+          <a:p>
+            <a:fld id="{EEA4CB10-01EC-4F0B-B0D3-B7B5571F5409}" type="slidenum">
+              <a:rPr lang="en-US" smtClean="0"/>
+              <a:t>‹#›</a:t>
+            </a:fld>
+            <a:endParaRPr lang="en-US"/>
+          </a:p>
+        </p:txBody>
+      </p:sp>
+      <p:sp>
+        <p:nvSpPr>
+          <p:cNvPr id="1" name="Text 1"/>
+          <p:cNvSpPr txBox="1"/>
+          <p:nvPr/>
+        </p:nvSpPr>
+        <p:spPr>
+          <a:xfrm>
+            <a:off x="3175000" y="254000"/>
+            <a:ext cx="2540000" cy="381000"/>
+          </a:xfrm>
+          <a:prstGeom prst="rect">
+            <a:avLst/>
+          </a:prstGeom>
+          <a:noFill/>
+        </p:spPr>
+        <p:txBody>
+          <a:bodyPr rtlCol="0" lIns="0" tIns="0" rIns="0" bIns="0" wrap="square" anchor="ctr"/>
+          <a:lstStyle/>
+          <a:p/>
+        </p:txBody>
+      </p:sp>
+      <p:sp>
+        <p:nvSpPr>
+          <p:cNvPr id="3" name="Text 3"/>
+          <p:cNvSpPr txBox="1"/>
+          <p:nvPr/>
+        </p:nvSpPr>
+        <p:spPr>
+          <a:xfrm>
+            <a:off x="1016000" y="3175000"/>
+            <a:ext cx="3175000" cy="381000"/>
+          </a:xfrm>
+          <a:prstGeom prst="rect">
+            <a:avLst/>
+          </a:prstGeom>
+          <a:noFill/>
+        </p:spPr>
+        <p:txBody>
+          <a:bodyPr rtlCol="0" lIns="0" tIns="0" rIns="0" bIns="0" wrap="square" anchor="ctr"/>
+          <a:lstStyle/>
+          <a:p>
+            <a:pPr/>
+            <a:r>
+              <a:rPr lang="en-US" smtClean="0" sz="2500">
+                <a:solidFill>
+                  <a:srgbClr val="312921"/>
+                </a:solidFill>
+                <a:latin typeface="Calibri" pitchFamily="0" charset="0"/>
+                <a:cs typeface="Calibri" pitchFamily="0" charset="0"/>
+              </a:rPr>
+              <a:t>Внешним видом и повадками киви настолько отличаются от других птиц, что зоолог Уильям Кальдер (англ William A Calder III) называл их «почётными млекопитающими».</a:t>
+            </a:r>
+          </a:p>
+        </p:txBody>
+      </p:sp>
+      <p:pic>
+        <p:nvPicPr>
+          <p:cNvPr id="4" name="image-5df3bc62-e366-4094-8be6-08e9f6cbc366.jpg 4" descr="image-5df3bc62-e366-4094-8be6-08e9f6cbc366.jpg"/>
+          <p:cNvPicPr>
+            <a:picLocks noChangeAspect="1"/>
+          </p:cNvPicPr>
+          <p:nvPr/>
+        </p:nvPicPr>
+        <p:blipFill>
+          <a:blip r:embed="rId2" cstate="print"/>
+          <a:stretch>
+            <a:fillRect/>
+          </a:stretch>
+        </p:blipFill>
+        <p:spPr>
+          <a:xfrm>
+            <a:off x="4699000" y="1905000"/>
+            <a:ext cx="3810000" cy="2417028"/>
+          </a:xfrm>
+          <a:prstGeom prst="rect">
+            <a:avLst/>
+          </a:prstGeom>
+        </p:spPr>
+      </p:pic>
+    </p:spTree>
+  </p:cSld>
+  <p:clrMapOvr>
+    <a:masterClrMapping/>
+  </p:clrMapOvr>
+</p:sld>
+</file>
+
+<file path=ppt/slides/slide4.xml><?xml version="1.0" encoding="utf-8"?>
+<p:sld xmlns:a="http://schemas.openxmlformats.org/drawingml/2006/main" xmlns:r="http://schemas.openxmlformats.org/officeDocument/2006/relationships" xmlns:p="http://schemas.openxmlformats.org/presentationml/2006/main">
+  <p:cSld name="Blank">
+    <p:spTree>
+      <p:nvGrpSpPr>
+        <p:cNvPr id="1" name=""/>
+        <p:cNvGrpSpPr/>
+        <p:nvPr/>
+      </p:nvGrpSpPr>
+      <p:grpSpPr>
+        <a:xfrm>
+          <a:off x="0" y="0"/>
+          <a:ext cx="0" cy="0"/>
+          <a:chOff x="0" y="0"/>
+          <a:chExt cx="0" cy="0"/>
+        </a:xfrm>
+      </p:grpSpPr>
+      <p:sp>
+        <p:nvSpPr>
+          <p:cNvPr id="4" name="Slide Number Placeholder 3"/>
+          <p:cNvSpPr>
+            <a:spLocks noGrp="1"/>
+          </p:cNvSpPr>
+          <p:nvPr>
+            <p:ph type="sldNum" sz="quarter" idx="12"/>
+          </p:nvPr>
+        </p:nvSpPr>
+        <p:spPr/>
+        <p:txBody>
+          <a:bodyPr/>
+          <a:lstStyle/>
+          <a:p>
+            <a:fld id="{EEA4CB10-01EC-4F0B-B0D3-B7B5571F5409}" type="slidenum">
+              <a:rPr lang="en-US" smtClean="0"/>
+              <a:t>‹#›</a:t>
+            </a:fld>
+            <a:endParaRPr lang="en-US"/>
+          </a:p>
+        </p:txBody>
+      </p:sp>
+      <p:sp>
+        <p:nvSpPr>
+          <p:cNvPr id="1" name="Text 1"/>
+          <p:cNvSpPr txBox="1"/>
+          <p:nvPr/>
+        </p:nvSpPr>
+        <p:spPr>
+          <a:xfrm>
+            <a:off x="3175000" y="254000"/>
+            <a:ext cx="2540000" cy="381000"/>
+          </a:xfrm>
+          <a:prstGeom prst="rect">
+            <a:avLst/>
+          </a:prstGeom>
+          <a:noFill/>
+        </p:spPr>
+        <p:txBody>
+          <a:bodyPr rtlCol="0" lIns="0" tIns="0" rIns="0" bIns="0" wrap="square" anchor="ctr"/>
+          <a:lstStyle/>
+          <a:p>
+            <a:pPr algn="ctr"/>
+            <a:r>
+              <a:rPr lang="en-US" smtClean="0" sz="3500">
+                <a:solidFill>
+                  <a:srgbClr val="312921"/>
+                </a:solidFill>
+                <a:latin typeface="Calibri" pitchFamily="0" charset="0"/>
+                <a:cs typeface="Calibri" pitchFamily="0" charset="0"/>
+              </a:rPr>
+              <a:t>Спасибо за внимание</a:t>
+            </a:r>
+          </a:p>
+        </p:txBody>
+      </p:sp>
+      <p:sp>
+        <p:nvSpPr>
+          <p:cNvPr id="3" name="Text 3"/>
+          <p:cNvSpPr txBox="1"/>
+          <p:nvPr/>
+        </p:nvSpPr>
+        <p:spPr>
+          <a:xfrm>
+            <a:off x="1016000" y="3175000"/>
+            <a:ext cx="3175000" cy="381000"/>
+          </a:xfrm>
+          <a:prstGeom prst="rect">
+            <a:avLst/>
+          </a:prstGeom>
+          <a:noFill/>
+        </p:spPr>
+        <p:txBody>
+          <a:bodyPr rtlCol="0" lIns="0" tIns="0" rIns="0" bIns="0" wrap="square" anchor="ctr"/>
+          <a:lstStyle/>
+          <a:p/>
+        </p:txBody>
+      </p:sp>
+      <p:pic>
+        <p:nvPicPr>
+          <p:cNvPr id="4" name="image-cdfbb1c4-a673-4bbd-9258-8541fe0bbf3c.jpg 4" descr="image-cdfbb1c4-a673-4bbd-9258-8541fe0bbf3c.jpg"/>
+          <p:cNvPicPr>
+            <a:picLocks noChangeAspect="1"/>
+          </p:cNvPicPr>
+          <p:nvPr/>
+        </p:nvPicPr>
+        <p:blipFill>
+          <a:blip r:embed="rId2" cstate="print"/>
+          <a:stretch>
+            <a:fillRect/>
+          </a:stretch>
+        </p:blipFill>
+        <p:spPr>
+          <a:xfrm>
+            <a:off x="4699000" y="1905000"/>
+            <a:ext cx="3810000" cy="2540000"/>
+          </a:xfrm>
+          <a:prstGeom prst="rect">
+            <a:avLst/>
+          </a:prstGeom>
+        </p:spPr>
+      </p:pic>
     </p:spTree>
   </p:cSld>
   <p:clrMapOvr>

</xml_diff>

<commit_message>
2.0.0 Clearer structure separation, README file update, addition of a quick start file for windows, change in presentation creation instead of split and regular expressions, slides are created using forms, presentation can now be downloaded through a browser 06.02.2022
</commit_message>
<xml_diff>
--- a/storage/app.pptx
+++ b/storage/app.pptx
@@ -5,10 +5,8 @@
     <p:sldMasterId id="2147483648" r:id="rId1"/>
   </p:sldMasterIdLst>
   <p:sldIdLst>
-    <p:sldId id="256" r:id="rId-6d96cb0b-c0be-4bae-a801-1ea40fabe6b1"/>
-    <p:sldId id="257" r:id="rId-adc1b352-72de-4ff6-a1e4-8bc143e4470a"/>
-    <p:sldId id="258" r:id="rId-2d7e8e93-3b0a-4c7d-b0e6-1d8395c6d998"/>
-    <p:sldId id="259" r:id="rId-2226a183-4bd6-4db8-8397-7e19efc0dfba"/>
+    <p:sldId id="256" r:id="rId-07571aa8-e30e-4b5a-890e-a934290e3e0f"/>
+    <p:sldId id="257" r:id="rId-44b73b51-141f-4d1b-aead-d94e68fb714d"/>
   </p:sldIdLst>
   <p:sldSz cx="9144000" cy="6858000"/>
   <p:notesSz cx="9144000" cy="6858000"/>
@@ -722,14 +720,14 @@
                 <a:latin typeface="Calibri" pitchFamily="0" charset="0"/>
                 <a:cs typeface="Calibri" pitchFamily="0" charset="0"/>
               </a:rPr>
-              <a:t>Птица киви</a:t>
+              <a:t>dq</a:t>
             </a:r>
           </a:p>
         </p:txBody>
       </p:sp>
       <p:sp>
         <p:nvSpPr>
-          <p:cNvPr id="3" name="Text 3"/>
+          <p:cNvPr id="2" name="Text 2"/>
           <p:cNvSpPr txBox="1"/>
           <p:nvPr/>
         </p:nvSpPr>
@@ -756,35 +754,11 @@
                 <a:latin typeface="Calibri" pitchFamily="0" charset="0"/>
                 <a:cs typeface="Calibri" pitchFamily="0" charset="0"/>
               </a:rPr>
-              <a:t>Ки́ви (лат Apteryx) — единственный род бескилевых птиц в одноимённом семействе (Apterygidae) и отряде кивиобра́зных, или бескры́лых (Apterygiformes).</a:t>
+              <a:t>21wfcwq</a:t>
             </a:r>
           </a:p>
         </p:txBody>
       </p:sp>
-      <p:pic>
-        <p:nvPicPr>
-          <p:cNvPr id="4" name="image-ba71ecec-4bf5-4a9d-8a31-2ce9f35d5b8d.jpg 4" descr="image-ba71ecec-4bf5-4a9d-8a31-2ce9f35d5b8d.jpg"/>
-          <p:cNvPicPr>
-            <a:picLocks noChangeAspect="1"/>
-          </p:cNvPicPr>
-          <p:nvPr/>
-        </p:nvPicPr>
-        <p:blipFill>
-          <a:blip r:embed="rId2" cstate="print"/>
-          <a:stretch>
-            <a:fillRect/>
-          </a:stretch>
-        </p:blipFill>
-        <p:spPr>
-          <a:xfrm>
-            <a:off x="4699000" y="1905000"/>
-            <a:ext cx="3810000" cy="2857500"/>
-          </a:xfrm>
-          <a:prstGeom prst="rect">
-            <a:avLst/>
-          </a:prstGeom>
-        </p:spPr>
-      </p:pic>
     </p:spTree>
   </p:cSld>
   <p:clrMapOvr>
@@ -862,14 +836,14 @@
                 <a:latin typeface="Calibri" pitchFamily="0" charset="0"/>
                 <a:cs typeface="Calibri" pitchFamily="0" charset="0"/>
               </a:rPr>
-              <a:t>Характеристика</a:t>
+              <a:t>kuilu</a:t>
             </a:r>
           </a:p>
         </p:txBody>
       </p:sp>
       <p:sp>
         <p:nvSpPr>
-          <p:cNvPr id="3" name="Text 3"/>
+          <p:cNvPr id="2" name="Text 2"/>
           <p:cNvSpPr txBox="1"/>
           <p:nvPr/>
         </p:nvSpPr>
@@ -896,291 +870,11 @@
                 <a:latin typeface="Calibri" pitchFamily="0" charset="0"/>
                 <a:cs typeface="Calibri" pitchFamily="0" charset="0"/>
               </a:rPr>
-              <a:t>Включает пять видов, эндемичных для Новой Зеландии.</a:t>
+              <a:t>ved</a:t>
             </a:r>
           </a:p>
         </p:txBody>
       </p:sp>
-      <p:pic>
-        <p:nvPicPr>
-          <p:cNvPr id="4" name="image-126ec006-e388-4bb5-83a1-53d126dee5e3.jpg 4" descr="image-126ec006-e388-4bb5-83a1-53d126dee5e3.jpg"/>
-          <p:cNvPicPr>
-            <a:picLocks noChangeAspect="1"/>
-          </p:cNvPicPr>
-          <p:nvPr/>
-        </p:nvPicPr>
-        <p:blipFill>
-          <a:blip r:embed="rId2" cstate="print"/>
-          <a:stretch>
-            <a:fillRect/>
-          </a:stretch>
-        </p:blipFill>
-        <p:spPr>
-          <a:xfrm>
-            <a:off x="4699000" y="1905000"/>
-            <a:ext cx="3810000" cy="2540000"/>
-          </a:xfrm>
-          <a:prstGeom prst="rect">
-            <a:avLst/>
-          </a:prstGeom>
-        </p:spPr>
-      </p:pic>
-    </p:spTree>
-  </p:cSld>
-  <p:clrMapOvr>
-    <a:masterClrMapping/>
-  </p:clrMapOvr>
-</p:sld>
-</file>
-
-<file path=ppt/slides/slide3.xml><?xml version="1.0" encoding="utf-8"?>
-<p:sld xmlns:a="http://schemas.openxmlformats.org/drawingml/2006/main" xmlns:r="http://schemas.openxmlformats.org/officeDocument/2006/relationships" xmlns:p="http://schemas.openxmlformats.org/presentationml/2006/main">
-  <p:cSld name="Blank">
-    <p:spTree>
-      <p:nvGrpSpPr>
-        <p:cNvPr id="1" name=""/>
-        <p:cNvGrpSpPr/>
-        <p:nvPr/>
-      </p:nvGrpSpPr>
-      <p:grpSpPr>
-        <a:xfrm>
-          <a:off x="0" y="0"/>
-          <a:ext cx="0" cy="0"/>
-          <a:chOff x="0" y="0"/>
-          <a:chExt cx="0" cy="0"/>
-        </a:xfrm>
-      </p:grpSpPr>
-      <p:sp>
-        <p:nvSpPr>
-          <p:cNvPr id="4" name="Slide Number Placeholder 3"/>
-          <p:cNvSpPr>
-            <a:spLocks noGrp="1"/>
-          </p:cNvSpPr>
-          <p:nvPr>
-            <p:ph type="sldNum" sz="quarter" idx="12"/>
-          </p:nvPr>
-        </p:nvSpPr>
-        <p:spPr/>
-        <p:txBody>
-          <a:bodyPr/>
-          <a:lstStyle/>
-          <a:p>
-            <a:fld id="{EEA4CB10-01EC-4F0B-B0D3-B7B5571F5409}" type="slidenum">
-              <a:rPr lang="en-US" smtClean="0"/>
-              <a:t>‹#›</a:t>
-            </a:fld>
-            <a:endParaRPr lang="en-US"/>
-          </a:p>
-        </p:txBody>
-      </p:sp>
-      <p:sp>
-        <p:nvSpPr>
-          <p:cNvPr id="1" name="Text 1"/>
-          <p:cNvSpPr txBox="1"/>
-          <p:nvPr/>
-        </p:nvSpPr>
-        <p:spPr>
-          <a:xfrm>
-            <a:off x="3175000" y="254000"/>
-            <a:ext cx="2540000" cy="381000"/>
-          </a:xfrm>
-          <a:prstGeom prst="rect">
-            <a:avLst/>
-          </a:prstGeom>
-          <a:noFill/>
-        </p:spPr>
-        <p:txBody>
-          <a:bodyPr rtlCol="0" lIns="0" tIns="0" rIns="0" bIns="0" wrap="square" anchor="ctr"/>
-          <a:lstStyle/>
-          <a:p/>
-        </p:txBody>
-      </p:sp>
-      <p:sp>
-        <p:nvSpPr>
-          <p:cNvPr id="3" name="Text 3"/>
-          <p:cNvSpPr txBox="1"/>
-          <p:nvPr/>
-        </p:nvSpPr>
-        <p:spPr>
-          <a:xfrm>
-            <a:off x="1016000" y="3175000"/>
-            <a:ext cx="3175000" cy="381000"/>
-          </a:xfrm>
-          <a:prstGeom prst="rect">
-            <a:avLst/>
-          </a:prstGeom>
-          <a:noFill/>
-        </p:spPr>
-        <p:txBody>
-          <a:bodyPr rtlCol="0" lIns="0" tIns="0" rIns="0" bIns="0" wrap="square" anchor="ctr"/>
-          <a:lstStyle/>
-          <a:p>
-            <a:pPr/>
-            <a:r>
-              <a:rPr lang="en-US" smtClean="0" sz="2500">
-                <a:solidFill>
-                  <a:srgbClr val="312921"/>
-                </a:solidFill>
-                <a:latin typeface="Calibri" pitchFamily="0" charset="0"/>
-                <a:cs typeface="Calibri" pitchFamily="0" charset="0"/>
-              </a:rPr>
-              <a:t>Внешним видом и повадками киви настолько отличаются от других птиц, что зоолог Уильям Кальдер (англ William A Calder III) называл их «почётными млекопитающими».</a:t>
-            </a:r>
-          </a:p>
-        </p:txBody>
-      </p:sp>
-      <p:pic>
-        <p:nvPicPr>
-          <p:cNvPr id="4" name="image-5df3bc62-e366-4094-8be6-08e9f6cbc366.jpg 4" descr="image-5df3bc62-e366-4094-8be6-08e9f6cbc366.jpg"/>
-          <p:cNvPicPr>
-            <a:picLocks noChangeAspect="1"/>
-          </p:cNvPicPr>
-          <p:nvPr/>
-        </p:nvPicPr>
-        <p:blipFill>
-          <a:blip r:embed="rId2" cstate="print"/>
-          <a:stretch>
-            <a:fillRect/>
-          </a:stretch>
-        </p:blipFill>
-        <p:spPr>
-          <a:xfrm>
-            <a:off x="4699000" y="1905000"/>
-            <a:ext cx="3810000" cy="2417028"/>
-          </a:xfrm>
-          <a:prstGeom prst="rect">
-            <a:avLst/>
-          </a:prstGeom>
-        </p:spPr>
-      </p:pic>
-    </p:spTree>
-  </p:cSld>
-  <p:clrMapOvr>
-    <a:masterClrMapping/>
-  </p:clrMapOvr>
-</p:sld>
-</file>
-
-<file path=ppt/slides/slide4.xml><?xml version="1.0" encoding="utf-8"?>
-<p:sld xmlns:a="http://schemas.openxmlformats.org/drawingml/2006/main" xmlns:r="http://schemas.openxmlformats.org/officeDocument/2006/relationships" xmlns:p="http://schemas.openxmlformats.org/presentationml/2006/main">
-  <p:cSld name="Blank">
-    <p:spTree>
-      <p:nvGrpSpPr>
-        <p:cNvPr id="1" name=""/>
-        <p:cNvGrpSpPr/>
-        <p:nvPr/>
-      </p:nvGrpSpPr>
-      <p:grpSpPr>
-        <a:xfrm>
-          <a:off x="0" y="0"/>
-          <a:ext cx="0" cy="0"/>
-          <a:chOff x="0" y="0"/>
-          <a:chExt cx="0" cy="0"/>
-        </a:xfrm>
-      </p:grpSpPr>
-      <p:sp>
-        <p:nvSpPr>
-          <p:cNvPr id="4" name="Slide Number Placeholder 3"/>
-          <p:cNvSpPr>
-            <a:spLocks noGrp="1"/>
-          </p:cNvSpPr>
-          <p:nvPr>
-            <p:ph type="sldNum" sz="quarter" idx="12"/>
-          </p:nvPr>
-        </p:nvSpPr>
-        <p:spPr/>
-        <p:txBody>
-          <a:bodyPr/>
-          <a:lstStyle/>
-          <a:p>
-            <a:fld id="{EEA4CB10-01EC-4F0B-B0D3-B7B5571F5409}" type="slidenum">
-              <a:rPr lang="en-US" smtClean="0"/>
-              <a:t>‹#›</a:t>
-            </a:fld>
-            <a:endParaRPr lang="en-US"/>
-          </a:p>
-        </p:txBody>
-      </p:sp>
-      <p:sp>
-        <p:nvSpPr>
-          <p:cNvPr id="1" name="Text 1"/>
-          <p:cNvSpPr txBox="1"/>
-          <p:nvPr/>
-        </p:nvSpPr>
-        <p:spPr>
-          <a:xfrm>
-            <a:off x="3175000" y="254000"/>
-            <a:ext cx="2540000" cy="381000"/>
-          </a:xfrm>
-          <a:prstGeom prst="rect">
-            <a:avLst/>
-          </a:prstGeom>
-          <a:noFill/>
-        </p:spPr>
-        <p:txBody>
-          <a:bodyPr rtlCol="0" lIns="0" tIns="0" rIns="0" bIns="0" wrap="square" anchor="ctr"/>
-          <a:lstStyle/>
-          <a:p>
-            <a:pPr algn="ctr"/>
-            <a:r>
-              <a:rPr lang="en-US" smtClean="0" sz="3500">
-                <a:solidFill>
-                  <a:srgbClr val="312921"/>
-                </a:solidFill>
-                <a:latin typeface="Calibri" pitchFamily="0" charset="0"/>
-                <a:cs typeface="Calibri" pitchFamily="0" charset="0"/>
-              </a:rPr>
-              <a:t>Спасибо за внимание</a:t>
-            </a:r>
-          </a:p>
-        </p:txBody>
-      </p:sp>
-      <p:sp>
-        <p:nvSpPr>
-          <p:cNvPr id="3" name="Text 3"/>
-          <p:cNvSpPr txBox="1"/>
-          <p:nvPr/>
-        </p:nvSpPr>
-        <p:spPr>
-          <a:xfrm>
-            <a:off x="1016000" y="3175000"/>
-            <a:ext cx="3175000" cy="381000"/>
-          </a:xfrm>
-          <a:prstGeom prst="rect">
-            <a:avLst/>
-          </a:prstGeom>
-          <a:noFill/>
-        </p:spPr>
-        <p:txBody>
-          <a:bodyPr rtlCol="0" lIns="0" tIns="0" rIns="0" bIns="0" wrap="square" anchor="ctr"/>
-          <a:lstStyle/>
-          <a:p/>
-        </p:txBody>
-      </p:sp>
-      <p:pic>
-        <p:nvPicPr>
-          <p:cNvPr id="4" name="image-cdfbb1c4-a673-4bbd-9258-8541fe0bbf3c.jpg 4" descr="image-cdfbb1c4-a673-4bbd-9258-8541fe0bbf3c.jpg"/>
-          <p:cNvPicPr>
-            <a:picLocks noChangeAspect="1"/>
-          </p:cNvPicPr>
-          <p:nvPr/>
-        </p:nvPicPr>
-        <p:blipFill>
-          <a:blip r:embed="rId2" cstate="print"/>
-          <a:stretch>
-            <a:fillRect/>
-          </a:stretch>
-        </p:blipFill>
-        <p:spPr>
-          <a:xfrm>
-            <a:off x="4699000" y="1905000"/>
-            <a:ext cx="3810000" cy="2540000"/>
-          </a:xfrm>
-          <a:prstGeom prst="rect">
-            <a:avLst/>
-          </a:prstGeom>
-        </p:spPr>
-      </p:pic>
     </p:spTree>
   </p:cSld>
   <p:clrMapOvr>

</xml_diff>

<commit_message>
2.1.0 add comments in all files, better good structure
</commit_message>
<xml_diff>
--- a/storage/app.pptx
+++ b/storage/app.pptx
@@ -5,8 +5,8 @@
     <p:sldMasterId id="2147483648" r:id="rId1"/>
   </p:sldMasterIdLst>
   <p:sldIdLst>
-    <p:sldId id="256" r:id="rId-07571aa8-e30e-4b5a-890e-a934290e3e0f"/>
-    <p:sldId id="257" r:id="rId-44b73b51-141f-4d1b-aead-d94e68fb714d"/>
+    <p:sldId id="256" r:id="rId-fc9ca284-5ac2-4a47-870f-e0e17eca2767"/>
+    <p:sldId id="257" r:id="rId-c203eece-dc04-42a4-9744-c15fb37fb984"/>
   </p:sldIdLst>
   <p:sldSz cx="9144000" cy="6858000"/>
   <p:notesSz cx="9144000" cy="6858000"/>
@@ -720,7 +720,7 @@
                 <a:latin typeface="Calibri" pitchFamily="0" charset="0"/>
                 <a:cs typeface="Calibri" pitchFamily="0" charset="0"/>
               </a:rPr>
-              <a:t>dq</a:t>
+              <a:t>q</a:t>
             </a:r>
           </a:p>
         </p:txBody>
@@ -754,7 +754,7 @@
                 <a:latin typeface="Calibri" pitchFamily="0" charset="0"/>
                 <a:cs typeface="Calibri" pitchFamily="0" charset="0"/>
               </a:rPr>
-              <a:t>21wfcwq</a:t>
+              <a:t>cwq</a:t>
             </a:r>
           </a:p>
         </p:txBody>
@@ -826,19 +826,7 @@
         <p:txBody>
           <a:bodyPr rtlCol="0" lIns="0" tIns="0" rIns="0" bIns="0" wrap="square" anchor="ctr"/>
           <a:lstStyle/>
-          <a:p>
-            <a:pPr algn="ctr"/>
-            <a:r>
-              <a:rPr lang="en-US" smtClean="0" sz="3500">
-                <a:solidFill>
-                  <a:srgbClr val="312921"/>
-                </a:solidFill>
-                <a:latin typeface="Calibri" pitchFamily="0" charset="0"/>
-                <a:cs typeface="Calibri" pitchFamily="0" charset="0"/>
-              </a:rPr>
-              <a:t>kuilu</a:t>
-            </a:r>
-          </a:p>
+          <a:p/>
         </p:txBody>
       </p:sp>
       <p:sp>
@@ -870,7 +858,7 @@
                 <a:latin typeface="Calibri" pitchFamily="0" charset="0"/>
                 <a:cs typeface="Calibri" pitchFamily="0" charset="0"/>
               </a:rPr>
-              <a:t>ved</a:t>
+              <a:t>cqw</a:t>
             </a:r>
           </a:p>
         </p:txBody>

</xml_diff>